<commit_message>
fixed issue with spacey popup not appearing at correct time
</commit_message>
<xml_diff>
--- a/Presentation1.pptx
+++ b/Presentation1.pptx
@@ -6124,7 +6124,7 @@
         <p:spPr>
           <a:xfrm>
             <a:off x="3479799" y="751344"/>
-            <a:ext cx="8229600" cy="1569660"/>
+            <a:ext cx="8229600" cy="2308324"/>
           </a:xfrm>
           <a:prstGeom prst="rect">
             <a:avLst/>
@@ -6190,6 +6190,34 @@
                 </a:solidFill>
               </a:rPr>
               <a:t>Bug fixes</a:t>
+            </a:r>
+          </a:p>
+          <a:p>
+            <a:pPr marL="285750" indent="-285750">
+              <a:buFont typeface="Arial" panose="020B0604020202020204" pitchFamily="34" charset="0"/>
+              <a:buChar char="•"/>
+            </a:pPr>
+            <a:r>
+              <a:rPr lang="en-US" sz="2400" dirty="0">
+                <a:solidFill>
+                  <a:schemeClr val="bg1"/>
+                </a:solidFill>
+              </a:rPr>
+              <a:t>Can’t yet split cards</a:t>
+            </a:r>
+          </a:p>
+          <a:p>
+            <a:pPr marL="285750" indent="-285750">
+              <a:buFont typeface="Arial" panose="020B0604020202020204" pitchFamily="34" charset="0"/>
+              <a:buChar char="•"/>
+            </a:pPr>
+            <a:r>
+              <a:rPr lang="en-US" sz="2400" dirty="0">
+                <a:solidFill>
+                  <a:schemeClr val="bg1"/>
+                </a:solidFill>
+              </a:rPr>
+              <a:t>Online Multi-Player</a:t>
             </a:r>
             <a:endParaRPr lang="en-AU" sz="2400" dirty="0">
               <a:solidFill>

</xml_diff>

<commit_message>
fixed multpile hitCrad bugs
</commit_message>
<xml_diff>
--- a/Presentation1.pptx
+++ b/Presentation1.pptx
@@ -110,6 +110,11 @@
       </a:defRPr>
     </a:lvl9pPr>
   </p:defaultTextStyle>
+  <p:extLst>
+    <p:ext uri="{EFAFB233-063F-42B5-8137-9DF3F51BA10A}">
+      <p15:sldGuideLst xmlns:p15="http://schemas.microsoft.com/office/powerpoint/2012/main"/>
+    </p:ext>
+  </p:extLst>
 </p:presentation>
 </file>
 
@@ -262,7 +267,7 @@
           <a:p>
             <a:fld id="{DE39FF52-02C6-49BD-984C-694B8A7CDDDA}" type="datetimeFigureOut">
               <a:rPr lang="en-AU" smtClean="0"/>
-              <a:t>22/10/2022</a:t>
+              <a:t>23/10/2022</a:t>
             </a:fld>
             <a:endParaRPr lang="en-AU"/>
           </a:p>
@@ -462,7 +467,7 @@
           <a:p>
             <a:fld id="{DE39FF52-02C6-49BD-984C-694B8A7CDDDA}" type="datetimeFigureOut">
               <a:rPr lang="en-AU" smtClean="0"/>
-              <a:t>22/10/2022</a:t>
+              <a:t>23/10/2022</a:t>
             </a:fld>
             <a:endParaRPr lang="en-AU"/>
           </a:p>
@@ -672,7 +677,7 @@
           <a:p>
             <a:fld id="{DE39FF52-02C6-49BD-984C-694B8A7CDDDA}" type="datetimeFigureOut">
               <a:rPr lang="en-AU" smtClean="0"/>
-              <a:t>22/10/2022</a:t>
+              <a:t>23/10/2022</a:t>
             </a:fld>
             <a:endParaRPr lang="en-AU"/>
           </a:p>
@@ -872,7 +877,7 @@
           <a:p>
             <a:fld id="{DE39FF52-02C6-49BD-984C-694B8A7CDDDA}" type="datetimeFigureOut">
               <a:rPr lang="en-AU" smtClean="0"/>
-              <a:t>22/10/2022</a:t>
+              <a:t>23/10/2022</a:t>
             </a:fld>
             <a:endParaRPr lang="en-AU"/>
           </a:p>
@@ -1148,7 +1153,7 @@
           <a:p>
             <a:fld id="{DE39FF52-02C6-49BD-984C-694B8A7CDDDA}" type="datetimeFigureOut">
               <a:rPr lang="en-AU" smtClean="0"/>
-              <a:t>22/10/2022</a:t>
+              <a:t>23/10/2022</a:t>
             </a:fld>
             <a:endParaRPr lang="en-AU"/>
           </a:p>
@@ -1416,7 +1421,7 @@
           <a:p>
             <a:fld id="{DE39FF52-02C6-49BD-984C-694B8A7CDDDA}" type="datetimeFigureOut">
               <a:rPr lang="en-AU" smtClean="0"/>
-              <a:t>22/10/2022</a:t>
+              <a:t>23/10/2022</a:t>
             </a:fld>
             <a:endParaRPr lang="en-AU"/>
           </a:p>
@@ -1831,7 +1836,7 @@
           <a:p>
             <a:fld id="{DE39FF52-02C6-49BD-984C-694B8A7CDDDA}" type="datetimeFigureOut">
               <a:rPr lang="en-AU" smtClean="0"/>
-              <a:t>22/10/2022</a:t>
+              <a:t>23/10/2022</a:t>
             </a:fld>
             <a:endParaRPr lang="en-AU"/>
           </a:p>
@@ -1973,7 +1978,7 @@
           <a:p>
             <a:fld id="{DE39FF52-02C6-49BD-984C-694B8A7CDDDA}" type="datetimeFigureOut">
               <a:rPr lang="en-AU" smtClean="0"/>
-              <a:t>22/10/2022</a:t>
+              <a:t>23/10/2022</a:t>
             </a:fld>
             <a:endParaRPr lang="en-AU"/>
           </a:p>
@@ -2086,7 +2091,7 @@
           <a:p>
             <a:fld id="{DE39FF52-02C6-49BD-984C-694B8A7CDDDA}" type="datetimeFigureOut">
               <a:rPr lang="en-AU" smtClean="0"/>
-              <a:t>22/10/2022</a:t>
+              <a:t>23/10/2022</a:t>
             </a:fld>
             <a:endParaRPr lang="en-AU"/>
           </a:p>
@@ -2399,7 +2404,7 @@
           <a:p>
             <a:fld id="{DE39FF52-02C6-49BD-984C-694B8A7CDDDA}" type="datetimeFigureOut">
               <a:rPr lang="en-AU" smtClean="0"/>
-              <a:t>22/10/2022</a:t>
+              <a:t>23/10/2022</a:t>
             </a:fld>
             <a:endParaRPr lang="en-AU"/>
           </a:p>
@@ -2688,7 +2693,7 @@
           <a:p>
             <a:fld id="{DE39FF52-02C6-49BD-984C-694B8A7CDDDA}" type="datetimeFigureOut">
               <a:rPr lang="en-AU" smtClean="0"/>
-              <a:t>22/10/2022</a:t>
+              <a:t>23/10/2022</a:t>
             </a:fld>
             <a:endParaRPr lang="en-AU"/>
           </a:p>
@@ -2931,7 +2936,7 @@
           <a:p>
             <a:fld id="{DE39FF52-02C6-49BD-984C-694B8A7CDDDA}" type="datetimeFigureOut">
               <a:rPr lang="en-AU" smtClean="0"/>
-              <a:t>22/10/2022</a:t>
+              <a:t>23/10/2022</a:t>
             </a:fld>
             <a:endParaRPr lang="en-AU"/>
           </a:p>
@@ -5493,7 +5498,7 @@
         <p:spPr>
           <a:xfrm>
             <a:off x="3479799" y="751344"/>
-            <a:ext cx="8229600" cy="2677656"/>
+            <a:ext cx="8229600" cy="5632311"/>
           </a:xfrm>
           <a:prstGeom prst="rect">
             <a:avLst/>
@@ -5558,8 +5563,177 @@
                   <a:schemeClr val="bg1"/>
                 </a:solidFill>
               </a:rPr>
-              <a:t>State management, stale state, set state batching issues</a:t>
-            </a:r>
+              <a:t>State management, </a:t>
+            </a:r>
+          </a:p>
+          <a:p>
+            <a:pPr marL="742950" lvl="1" indent="-285750">
+              <a:buFont typeface="Arial" panose="020B0604020202020204" pitchFamily="34" charset="0"/>
+              <a:buChar char="•"/>
+            </a:pPr>
+            <a:r>
+              <a:rPr lang="en-AU" sz="2400" dirty="0">
+                <a:solidFill>
+                  <a:schemeClr val="bg1"/>
+                </a:solidFill>
+              </a:rPr>
+              <a:t>Seemingly stale state, </a:t>
+            </a:r>
+          </a:p>
+          <a:p>
+            <a:pPr marL="742950" lvl="1" indent="-285750">
+              <a:buFont typeface="Arial" panose="020B0604020202020204" pitchFamily="34" charset="0"/>
+              <a:buChar char="•"/>
+            </a:pPr>
+            <a:r>
+              <a:rPr lang="en-AU" sz="2400" dirty="0">
+                <a:solidFill>
+                  <a:schemeClr val="bg1"/>
+                </a:solidFill>
+              </a:rPr>
+              <a:t>Set state batching issues</a:t>
+            </a:r>
+          </a:p>
+          <a:p>
+            <a:pPr marL="742950" lvl="1" indent="-285750">
+              <a:buFont typeface="Arial" panose="020B0604020202020204" pitchFamily="34" charset="0"/>
+              <a:buChar char="•"/>
+            </a:pPr>
+            <a:r>
+              <a:rPr lang="en-AU" sz="2400" dirty="0" err="1">
+                <a:solidFill>
+                  <a:schemeClr val="bg1"/>
+                </a:solidFill>
+              </a:rPr>
+              <a:t>useContext</a:t>
+            </a:r>
+            <a:r>
+              <a:rPr lang="en-AU" sz="2400" dirty="0">
+                <a:solidFill>
+                  <a:schemeClr val="bg1"/>
+                </a:solidFill>
+              </a:rPr>
+              <a:t>/</a:t>
+            </a:r>
+            <a:r>
+              <a:rPr lang="en-AU" sz="2400" dirty="0" err="1">
+                <a:solidFill>
+                  <a:schemeClr val="bg1"/>
+                </a:solidFill>
+              </a:rPr>
+              <a:t>useReducer</a:t>
+            </a:r>
+            <a:r>
+              <a:rPr lang="en-AU" sz="2400" dirty="0">
+                <a:solidFill>
+                  <a:schemeClr val="bg1"/>
+                </a:solidFill>
+              </a:rPr>
+              <a:t>/</a:t>
+            </a:r>
+            <a:r>
+              <a:rPr lang="en-AU" sz="2400" dirty="0" err="1">
+                <a:solidFill>
+                  <a:schemeClr val="bg1"/>
+                </a:solidFill>
+              </a:rPr>
+              <a:t>useRef</a:t>
+            </a:r>
+            <a:r>
+              <a:rPr lang="en-AU" sz="2400" dirty="0">
+                <a:solidFill>
+                  <a:schemeClr val="bg1"/>
+                </a:solidFill>
+              </a:rPr>
+              <a:t> hooks</a:t>
+            </a:r>
+          </a:p>
+          <a:p>
+            <a:pPr marL="742950" lvl="1" indent="-285750">
+              <a:buFont typeface="Arial" panose="020B0604020202020204" pitchFamily="34" charset="0"/>
+              <a:buChar char="•"/>
+            </a:pPr>
+            <a:endParaRPr lang="en-AU" sz="2400" dirty="0">
+              <a:solidFill>
+                <a:schemeClr val="bg1"/>
+              </a:solidFill>
+            </a:endParaRPr>
+          </a:p>
+          <a:p>
+            <a:pPr lvl="2"/>
+            <a:r>
+              <a:rPr lang="en-AU" sz="1600" dirty="0">
+                <a:solidFill>
+                  <a:schemeClr val="bg1"/>
+                </a:solidFill>
+              </a:rPr>
+              <a:t>// If count === 0</a:t>
+            </a:r>
+          </a:p>
+          <a:p>
+            <a:pPr lvl="2"/>
+            <a:endParaRPr lang="en-AU" sz="1600" dirty="0">
+              <a:solidFill>
+                <a:schemeClr val="bg1"/>
+              </a:solidFill>
+            </a:endParaRPr>
+          </a:p>
+          <a:p>
+            <a:pPr lvl="2"/>
+            <a:r>
+              <a:rPr lang="en-AU" sz="1600" dirty="0" err="1">
+                <a:solidFill>
+                  <a:schemeClr val="bg1"/>
+                </a:solidFill>
+              </a:rPr>
+              <a:t>setCount</a:t>
+            </a:r>
+            <a:r>
+              <a:rPr lang="en-AU" sz="1600" dirty="0">
+                <a:solidFill>
+                  <a:schemeClr val="bg1"/>
+                </a:solidFill>
+              </a:rPr>
+              <a:t>(count + 1)</a:t>
+            </a:r>
+          </a:p>
+          <a:p>
+            <a:pPr lvl="2"/>
+            <a:r>
+              <a:rPr lang="en-AU" sz="1600" dirty="0" err="1">
+                <a:solidFill>
+                  <a:schemeClr val="bg1"/>
+                </a:solidFill>
+              </a:rPr>
+              <a:t>setCount</a:t>
+            </a:r>
+            <a:r>
+              <a:rPr lang="en-AU" sz="1600" dirty="0">
+                <a:solidFill>
+                  <a:schemeClr val="bg1"/>
+                </a:solidFill>
+              </a:rPr>
+              <a:t>(count + 1)</a:t>
+            </a:r>
+          </a:p>
+          <a:p>
+            <a:pPr lvl="2"/>
+            <a:r>
+              <a:rPr lang="en-AU" sz="1600" dirty="0">
+                <a:solidFill>
+                  <a:schemeClr val="bg1"/>
+                </a:solidFill>
+              </a:rPr>
+              <a:t>Console.log(count) // = 1 || 2?</a:t>
+            </a:r>
+          </a:p>
+          <a:p>
+            <a:pPr lvl="2"/>
+            <a:endParaRPr lang="en-AU" sz="1600" dirty="0">
+              <a:solidFill>
+                <a:schemeClr val="bg1"/>
+              </a:solidFill>
+            </a:endParaRPr>
           </a:p>
           <a:p>
             <a:pPr marL="285750" indent="-285750">
@@ -6189,7 +6363,7 @@
                   <a:schemeClr val="bg1"/>
                 </a:solidFill>
               </a:rPr>
-              <a:t>Bug fixes</a:t>
+              <a:t>Lots of Bug fixes</a:t>
             </a:r>
           </a:p>
           <a:p>
@@ -6494,7 +6668,7 @@
           <a:lstStyle/>
           <a:p>
             <a:r>
-              <a:rPr lang="en-US" sz="2400" dirty="0">
+              <a:rPr lang="en-US" sz="2400" b="1" u="sng" dirty="0">
                 <a:solidFill>
                   <a:schemeClr val="bg1"/>
                 </a:solidFill>
@@ -6521,7 +6695,7 @@
           </a:p>
           <a:p>
             <a:r>
-              <a:rPr lang="en-AU" sz="2400" dirty="0">
+              <a:rPr lang="en-AU" sz="2400" b="1" u="sng" dirty="0">
                 <a:solidFill>
                   <a:schemeClr val="bg1"/>
                 </a:solidFill>
@@ -6548,7 +6722,7 @@
           </a:p>
           <a:p>
             <a:r>
-              <a:rPr lang="en-AU" sz="2400" dirty="0">
+              <a:rPr lang="en-AU" sz="2400" b="1" u="sng" dirty="0">
                 <a:solidFill>
                   <a:schemeClr val="bg1"/>
                 </a:solidFill>

</xml_diff>

<commit_message>
playing with offline/online page load
</commit_message>
<xml_diff>
--- a/Presentation1.pptx
+++ b/Presentation1.pptx
@@ -267,7 +267,7 @@
           <a:p>
             <a:fld id="{DE39FF52-02C6-49BD-984C-694B8A7CDDDA}" type="datetimeFigureOut">
               <a:rPr lang="en-AU" smtClean="0"/>
-              <a:t>23/10/2022</a:t>
+              <a:t>24/10/2022</a:t>
             </a:fld>
             <a:endParaRPr lang="en-AU"/>
           </a:p>
@@ -467,7 +467,7 @@
           <a:p>
             <a:fld id="{DE39FF52-02C6-49BD-984C-694B8A7CDDDA}" type="datetimeFigureOut">
               <a:rPr lang="en-AU" smtClean="0"/>
-              <a:t>23/10/2022</a:t>
+              <a:t>24/10/2022</a:t>
             </a:fld>
             <a:endParaRPr lang="en-AU"/>
           </a:p>
@@ -677,7 +677,7 @@
           <a:p>
             <a:fld id="{DE39FF52-02C6-49BD-984C-694B8A7CDDDA}" type="datetimeFigureOut">
               <a:rPr lang="en-AU" smtClean="0"/>
-              <a:t>23/10/2022</a:t>
+              <a:t>24/10/2022</a:t>
             </a:fld>
             <a:endParaRPr lang="en-AU"/>
           </a:p>
@@ -877,7 +877,7 @@
           <a:p>
             <a:fld id="{DE39FF52-02C6-49BD-984C-694B8A7CDDDA}" type="datetimeFigureOut">
               <a:rPr lang="en-AU" smtClean="0"/>
-              <a:t>23/10/2022</a:t>
+              <a:t>24/10/2022</a:t>
             </a:fld>
             <a:endParaRPr lang="en-AU"/>
           </a:p>
@@ -1153,7 +1153,7 @@
           <a:p>
             <a:fld id="{DE39FF52-02C6-49BD-984C-694B8A7CDDDA}" type="datetimeFigureOut">
               <a:rPr lang="en-AU" smtClean="0"/>
-              <a:t>23/10/2022</a:t>
+              <a:t>24/10/2022</a:t>
             </a:fld>
             <a:endParaRPr lang="en-AU"/>
           </a:p>
@@ -1421,7 +1421,7 @@
           <a:p>
             <a:fld id="{DE39FF52-02C6-49BD-984C-694B8A7CDDDA}" type="datetimeFigureOut">
               <a:rPr lang="en-AU" smtClean="0"/>
-              <a:t>23/10/2022</a:t>
+              <a:t>24/10/2022</a:t>
             </a:fld>
             <a:endParaRPr lang="en-AU"/>
           </a:p>
@@ -1836,7 +1836,7 @@
           <a:p>
             <a:fld id="{DE39FF52-02C6-49BD-984C-694B8A7CDDDA}" type="datetimeFigureOut">
               <a:rPr lang="en-AU" smtClean="0"/>
-              <a:t>23/10/2022</a:t>
+              <a:t>24/10/2022</a:t>
             </a:fld>
             <a:endParaRPr lang="en-AU"/>
           </a:p>
@@ -1978,7 +1978,7 @@
           <a:p>
             <a:fld id="{DE39FF52-02C6-49BD-984C-694B8A7CDDDA}" type="datetimeFigureOut">
               <a:rPr lang="en-AU" smtClean="0"/>
-              <a:t>23/10/2022</a:t>
+              <a:t>24/10/2022</a:t>
             </a:fld>
             <a:endParaRPr lang="en-AU"/>
           </a:p>
@@ -2091,7 +2091,7 @@
           <a:p>
             <a:fld id="{DE39FF52-02C6-49BD-984C-694B8A7CDDDA}" type="datetimeFigureOut">
               <a:rPr lang="en-AU" smtClean="0"/>
-              <a:t>23/10/2022</a:t>
+              <a:t>24/10/2022</a:t>
             </a:fld>
             <a:endParaRPr lang="en-AU"/>
           </a:p>
@@ -2404,7 +2404,7 @@
           <a:p>
             <a:fld id="{DE39FF52-02C6-49BD-984C-694B8A7CDDDA}" type="datetimeFigureOut">
               <a:rPr lang="en-AU" smtClean="0"/>
-              <a:t>23/10/2022</a:t>
+              <a:t>24/10/2022</a:t>
             </a:fld>
             <a:endParaRPr lang="en-AU"/>
           </a:p>
@@ -2693,7 +2693,7 @@
           <a:p>
             <a:fld id="{DE39FF52-02C6-49BD-984C-694B8A7CDDDA}" type="datetimeFigureOut">
               <a:rPr lang="en-AU" smtClean="0"/>
-              <a:t>23/10/2022</a:t>
+              <a:t>24/10/2022</a:t>
             </a:fld>
             <a:endParaRPr lang="en-AU"/>
           </a:p>
@@ -2936,7 +2936,7 @@
           <a:p>
             <a:fld id="{DE39FF52-02C6-49BD-984C-694B8A7CDDDA}" type="datetimeFigureOut">
               <a:rPr lang="en-AU" smtClean="0"/>
-              <a:t>23/10/2022</a:t>
+              <a:t>24/10/2022</a:t>
             </a:fld>
             <a:endParaRPr lang="en-AU"/>
           </a:p>
@@ -5498,7 +5498,7 @@
         <p:spPr>
           <a:xfrm>
             <a:off x="3479799" y="751344"/>
-            <a:ext cx="8229600" cy="5632311"/>
+            <a:ext cx="8229600" cy="7109639"/>
           </a:xfrm>
           <a:prstGeom prst="rect">
             <a:avLst/>
@@ -5549,7 +5549,7 @@
                   <a:schemeClr val="bg1"/>
                 </a:solidFill>
               </a:rPr>
-              <a:t>React component lifecycles and rendering</a:t>
+              <a:t>PWA offline/online database logic</a:t>
             </a:r>
           </a:p>
           <a:p>
@@ -5563,6 +5563,20 @@
                   <a:schemeClr val="bg1"/>
                 </a:solidFill>
               </a:rPr>
+              <a:t>React component lifecycles and rendering</a:t>
+            </a:r>
+          </a:p>
+          <a:p>
+            <a:pPr marL="285750" indent="-285750">
+              <a:buFont typeface="Arial" panose="020B0604020202020204" pitchFamily="34" charset="0"/>
+              <a:buChar char="•"/>
+            </a:pPr>
+            <a:r>
+              <a:rPr lang="en-AU" sz="2400" dirty="0">
+                <a:solidFill>
+                  <a:schemeClr val="bg1"/>
+                </a:solidFill>
+              </a:rPr>
               <a:t>State management, </a:t>
             </a:r>
           </a:p>
@@ -5592,60 +5606,6 @@
                 </a:solidFill>
               </a:rPr>
               <a:t>Set state batching issues</a:t>
-            </a:r>
-          </a:p>
-          <a:p>
-            <a:pPr marL="742950" lvl="1" indent="-285750">
-              <a:buFont typeface="Arial" panose="020B0604020202020204" pitchFamily="34" charset="0"/>
-              <a:buChar char="•"/>
-            </a:pPr>
-            <a:r>
-              <a:rPr lang="en-AU" sz="2400" dirty="0" err="1">
-                <a:solidFill>
-                  <a:schemeClr val="bg1"/>
-                </a:solidFill>
-              </a:rPr>
-              <a:t>useContext</a:t>
-            </a:r>
-            <a:r>
-              <a:rPr lang="en-AU" sz="2400" dirty="0">
-                <a:solidFill>
-                  <a:schemeClr val="bg1"/>
-                </a:solidFill>
-              </a:rPr>
-              <a:t>/</a:t>
-            </a:r>
-            <a:r>
-              <a:rPr lang="en-AU" sz="2400" dirty="0" err="1">
-                <a:solidFill>
-                  <a:schemeClr val="bg1"/>
-                </a:solidFill>
-              </a:rPr>
-              <a:t>useReducer</a:t>
-            </a:r>
-            <a:r>
-              <a:rPr lang="en-AU" sz="2400" dirty="0">
-                <a:solidFill>
-                  <a:schemeClr val="bg1"/>
-                </a:solidFill>
-              </a:rPr>
-              <a:t>/</a:t>
-            </a:r>
-            <a:r>
-              <a:rPr lang="en-AU" sz="2400" dirty="0" err="1">
-                <a:solidFill>
-                  <a:schemeClr val="bg1"/>
-                </a:solidFill>
-              </a:rPr>
-              <a:t>useRef</a:t>
-            </a:r>
-            <a:r>
-              <a:rPr lang="en-AU" sz="2400" dirty="0">
-                <a:solidFill>
-                  <a:schemeClr val="bg1"/>
-                </a:solidFill>
-              </a:rPr>
-              <a:t> hooks</a:t>
             </a:r>
           </a:p>
           <a:p>
@@ -5667,7 +5627,7 @@
                   <a:schemeClr val="bg1"/>
                 </a:solidFill>
               </a:rPr>
-              <a:t>// If count === 0</a:t>
+              <a:t>// assume count === 0</a:t>
             </a:r>
           </a:p>
           <a:p>
@@ -5726,6 +5686,100 @@
               </a:rPr>
               <a:t>Console.log(count) // = 1 || 2?</a:t>
             </a:r>
+          </a:p>
+          <a:p>
+            <a:pPr lvl="2"/>
+            <a:endParaRPr lang="en-AU" sz="1600" dirty="0">
+              <a:solidFill>
+                <a:schemeClr val="bg1"/>
+              </a:solidFill>
+            </a:endParaRPr>
+          </a:p>
+          <a:p>
+            <a:pPr marL="1200150" lvl="2" indent="-285750">
+              <a:buFont typeface="Arial" panose="020B0604020202020204" pitchFamily="34" charset="0"/>
+              <a:buChar char="•"/>
+            </a:pPr>
+            <a:r>
+              <a:rPr lang="en-AU" sz="1600" dirty="0" err="1">
+                <a:solidFill>
+                  <a:schemeClr val="bg1"/>
+                </a:solidFill>
+              </a:rPr>
+              <a:t>useContext</a:t>
+            </a:r>
+            <a:endParaRPr lang="en-AU" sz="1600" dirty="0">
+              <a:solidFill>
+                <a:schemeClr val="bg1"/>
+              </a:solidFill>
+            </a:endParaRPr>
+          </a:p>
+          <a:p>
+            <a:pPr marL="1200150" lvl="2" indent="-285750">
+              <a:buFont typeface="Arial" panose="020B0604020202020204" pitchFamily="34" charset="0"/>
+              <a:buChar char="•"/>
+            </a:pPr>
+            <a:r>
+              <a:rPr lang="en-AU" sz="1600" dirty="0" err="1">
+                <a:solidFill>
+                  <a:schemeClr val="bg1"/>
+                </a:solidFill>
+              </a:rPr>
+              <a:t>useReducer</a:t>
+            </a:r>
+            <a:endParaRPr lang="en-AU" sz="1600" dirty="0">
+              <a:solidFill>
+                <a:schemeClr val="bg1"/>
+              </a:solidFill>
+            </a:endParaRPr>
+          </a:p>
+          <a:p>
+            <a:pPr marL="1200150" lvl="2" indent="-285750">
+              <a:buFont typeface="Arial" panose="020B0604020202020204" pitchFamily="34" charset="0"/>
+              <a:buChar char="•"/>
+            </a:pPr>
+            <a:r>
+              <a:rPr lang="en-AU" sz="1600" dirty="0" err="1">
+                <a:solidFill>
+                  <a:schemeClr val="bg1"/>
+                </a:solidFill>
+              </a:rPr>
+              <a:t>useRef</a:t>
+            </a:r>
+            <a:endParaRPr lang="en-AU" sz="1600" dirty="0">
+              <a:solidFill>
+                <a:schemeClr val="bg1"/>
+              </a:solidFill>
+            </a:endParaRPr>
+          </a:p>
+          <a:p>
+            <a:pPr marL="1200150" lvl="2" indent="-285750">
+              <a:buFont typeface="Arial" panose="020B0604020202020204" pitchFamily="34" charset="0"/>
+              <a:buChar char="•"/>
+            </a:pPr>
+            <a:r>
+              <a:rPr lang="en-AU" sz="1600" b="0" dirty="0" err="1">
+                <a:solidFill>
+                  <a:schemeClr val="bg1"/>
+                </a:solidFill>
+                <a:effectLst/>
+                <a:latin typeface="Consolas" panose="020B0609020204030204" pitchFamily="49" charset="0"/>
+              </a:rPr>
+              <a:t>useWhatChanged</a:t>
+            </a:r>
+            <a:endParaRPr lang="en-AU" sz="1600" dirty="0">
+              <a:solidFill>
+                <a:schemeClr val="bg1"/>
+              </a:solidFill>
+            </a:endParaRPr>
+          </a:p>
+          <a:p>
+            <a:pPr lvl="2"/>
+            <a:endParaRPr lang="en-AU" sz="1600" dirty="0">
+              <a:solidFill>
+                <a:schemeClr val="bg1"/>
+              </a:solidFill>
+            </a:endParaRPr>
           </a:p>
           <a:p>
             <a:pPr lvl="2"/>

</xml_diff>